<commit_message>
user stories Fabi atualizado
</commit_message>
<xml_diff>
--- a/Documentação/ADS/User Stories/User Stories_fabi (1).pptx
+++ b/Documentação/ADS/User Stories/User Stories_fabi (1).pptx
@@ -11,6 +11,7 @@
     <p:sldId id="258" r:id="rId5"/>
     <p:sldId id="261" r:id="rId6"/>
     <p:sldId id="262" r:id="rId7"/>
+    <p:sldId id="263" r:id="rId8"/>
   </p:sldIdLst>
   <p:sldSz cx="12192000" cy="6858000"/>
   <p:notesSz cx="6858000" cy="9144000"/>
@@ -3748,7 +3749,7 @@
             </a:pPr>
             <a:r>
               <a:rPr lang="pt-BR" dirty="0"/>
-              <a:t>Como um cliente de corretoras de criptomoedas, eu quero ver informações sobre as moedas disponíveis para mineração, para que eu possa investir </a:t>
+              <a:t>Como um cliente de corretoras de criptomoedas, eu quero ver notícias sobre as moedas disponíveis para mineração, para que eu possa investir </a:t>
             </a:r>
           </a:p>
           <a:p>
@@ -3867,7 +3868,7 @@
           <a:p>
             <a:r>
               <a:rPr lang="pt-BR" dirty="0"/>
-              <a:t>Eu enquanto minerador, gostaria de uma ferramenta que monitorasse minha máquina para que pudesse ficar despreocupado ao trabalhar </a:t>
+              <a:t>Eu enquanto minerador, gostaria de uma solução que monitorasse minha máquina para avaliar o desempenho da minha GPU ao longo da mineração </a:t>
             </a:r>
           </a:p>
         </p:txBody>
@@ -3962,6 +3963,100 @@
     <p:extLst>
       <p:ext uri="{BB962C8B-B14F-4D97-AF65-F5344CB8AC3E}">
         <p14:creationId xmlns:p14="http://schemas.microsoft.com/office/powerpoint/2010/main" val="2112495212"/>
+      </p:ext>
+    </p:extLst>
+  </p:cSld>
+  <p:clrMapOvr>
+    <a:masterClrMapping/>
+  </p:clrMapOvr>
+</p:sld>
+</file>
+
+<file path=ppt/slides/slide7.xml><?xml version="1.0" encoding="utf-8"?>
+<p:sld xmlns:a="http://schemas.openxmlformats.org/drawingml/2006/main" xmlns:r="http://schemas.openxmlformats.org/officeDocument/2006/relationships" xmlns:p="http://schemas.openxmlformats.org/presentationml/2006/main">
+  <p:cSld>
+    <p:spTree>
+      <p:nvGrpSpPr>
+        <p:cNvPr id="1" name=""/>
+        <p:cNvGrpSpPr/>
+        <p:nvPr/>
+      </p:nvGrpSpPr>
+      <p:grpSpPr>
+        <a:xfrm>
+          <a:off x="0" y="0"/>
+          <a:ext cx="0" cy="0"/>
+          <a:chOff x="0" y="0"/>
+          <a:chExt cx="0" cy="0"/>
+        </a:xfrm>
+      </p:grpSpPr>
+      <p:sp>
+        <p:nvSpPr>
+          <p:cNvPr id="2" name="Título 1">
+            <a:extLst>
+              <a:ext uri="{FF2B5EF4-FFF2-40B4-BE49-F238E27FC236}">
+                <a16:creationId xmlns:a16="http://schemas.microsoft.com/office/drawing/2014/main" id="{95412FD4-838F-422C-AA0D-0C8C9FE1513F}"/>
+              </a:ext>
+            </a:extLst>
+          </p:cNvPr>
+          <p:cNvSpPr>
+            <a:spLocks noGrp="1"/>
+          </p:cNvSpPr>
+          <p:nvPr>
+            <p:ph type="title"/>
+          </p:nvPr>
+        </p:nvSpPr>
+        <p:spPr/>
+        <p:txBody>
+          <a:bodyPr/>
+          <a:lstStyle/>
+          <a:p>
+            <a:r>
+              <a:rPr lang="pt-BR" dirty="0"/>
+              <a:t>4</a:t>
+            </a:r>
+          </a:p>
+        </p:txBody>
+      </p:sp>
+      <p:sp>
+        <p:nvSpPr>
+          <p:cNvPr id="3" name="Espaço Reservado para Conteúdo 2">
+            <a:extLst>
+              <a:ext uri="{FF2B5EF4-FFF2-40B4-BE49-F238E27FC236}">
+                <a16:creationId xmlns:a16="http://schemas.microsoft.com/office/drawing/2014/main" id="{8079B95F-FD3B-4C23-8BE2-31A41C905AEE}"/>
+              </a:ext>
+            </a:extLst>
+          </p:cNvPr>
+          <p:cNvSpPr>
+            <a:spLocks noGrp="1"/>
+          </p:cNvSpPr>
+          <p:nvPr>
+            <p:ph idx="1"/>
+          </p:nvPr>
+        </p:nvSpPr>
+        <p:spPr/>
+        <p:txBody>
+          <a:bodyPr/>
+          <a:lstStyle/>
+          <a:p>
+            <a:r>
+              <a:rPr lang="pt-BR" dirty="0"/>
+              <a:t>Eu enquanto minerador iniciante, gostaria de ter acesso a um teste prévio de uma ferramenta de monitoramento para ter maior confiança para </a:t>
+            </a:r>
+            <a:r>
+              <a:rPr lang="pt-BR" dirty="0" err="1"/>
+              <a:t>compra-lá</a:t>
+            </a:r>
+            <a:r>
+              <a:rPr lang="pt-BR" dirty="0"/>
+              <a:t> </a:t>
+            </a:r>
+          </a:p>
+        </p:txBody>
+      </p:sp>
+    </p:spTree>
+    <p:extLst>
+      <p:ext uri="{BB962C8B-B14F-4D97-AF65-F5344CB8AC3E}">
+        <p14:creationId xmlns:p14="http://schemas.microsoft.com/office/powerpoint/2010/main" val="4249783638"/>
       </p:ext>
     </p:extLst>
   </p:cSld>

</xml_diff>